<commit_message>
added Snake-Code.docx and and Snake-Documentation.docx
</commit_message>
<xml_diff>
--- a/Java-Basics-Team-Dubai.pptx
+++ b/Java-Basics-Team-Dubai.pptx
@@ -7,7 +7,8 @@
   <p:sldIdLst>
     <p:sldId id="256" r:id="rId2"/>
     <p:sldId id="257" r:id="rId3"/>
-    <p:sldId id="258" r:id="rId4"/>
+    <p:sldId id="259" r:id="rId4"/>
+    <p:sldId id="258" r:id="rId5"/>
   </p:sldIdLst>
   <p:sldSz cx="12192000" cy="6858000"/>
   <p:notesSz cx="6858000" cy="9144000"/>
@@ -285,7 +286,7 @@
             <a:fld id="{B61BEF0D-F0BB-DE4B-95CE-6DB70DBA9567}" type="datetimeFigureOut">
               <a:rPr lang="en-US" smtClean="0"/>
               <a:pPr/>
-              <a:t>2/3/2015</a:t>
+              <a:t>2/4/2015</a:t>
             </a:fld>
             <a:endParaRPr lang="en-US" dirty="0"/>
           </a:p>
@@ -554,7 +555,7 @@
             <a:fld id="{B61BEF0D-F0BB-DE4B-95CE-6DB70DBA9567}" type="datetimeFigureOut">
               <a:rPr lang="en-US" smtClean="0"/>
               <a:pPr/>
-              <a:t>2/3/2015</a:t>
+              <a:t>2/4/2015</a:t>
             </a:fld>
             <a:endParaRPr lang="en-US" dirty="0"/>
           </a:p>
@@ -787,7 +788,7 @@
             <a:fld id="{B61BEF0D-F0BB-DE4B-95CE-6DB70DBA9567}" type="datetimeFigureOut">
               <a:rPr lang="en-US" smtClean="0"/>
               <a:pPr/>
-              <a:t>2/3/2015</a:t>
+              <a:t>2/4/2015</a:t>
             </a:fld>
             <a:endParaRPr lang="en-US" dirty="0"/>
           </a:p>
@@ -1099,7 +1100,7 @@
             <a:fld id="{B61BEF0D-F0BB-DE4B-95CE-6DB70DBA9567}" type="datetimeFigureOut">
               <a:rPr lang="en-US" smtClean="0"/>
               <a:pPr/>
-              <a:t>2/3/2015</a:t>
+              <a:t>2/4/2015</a:t>
             </a:fld>
             <a:endParaRPr lang="en-US" dirty="0"/>
           </a:p>
@@ -1574,7 +1575,7 @@
             <a:fld id="{B61BEF0D-F0BB-DE4B-95CE-6DB70DBA9567}" type="datetimeFigureOut">
               <a:rPr lang="en-US" smtClean="0"/>
               <a:pPr/>
-              <a:t>2/3/2015</a:t>
+              <a:t>2/4/2015</a:t>
             </a:fld>
             <a:endParaRPr lang="en-US" dirty="0"/>
           </a:p>
@@ -2123,7 +2124,7 @@
             <a:fld id="{B61BEF0D-F0BB-DE4B-95CE-6DB70DBA9567}" type="datetimeFigureOut">
               <a:rPr lang="en-US" smtClean="0"/>
               <a:pPr/>
-              <a:t>2/3/2015</a:t>
+              <a:t>2/4/2015</a:t>
             </a:fld>
             <a:endParaRPr lang="en-US" dirty="0"/>
           </a:p>
@@ -2899,7 +2900,7 @@
             <a:fld id="{B61BEF0D-F0BB-DE4B-95CE-6DB70DBA9567}" type="datetimeFigureOut">
               <a:rPr lang="en-US" smtClean="0"/>
               <a:pPr/>
-              <a:t>2/3/2015</a:t>
+              <a:t>2/4/2015</a:t>
             </a:fld>
             <a:endParaRPr lang="en-US" dirty="0"/>
           </a:p>
@@ -3076,7 +3077,7 @@
             <a:fld id="{B61BEF0D-F0BB-DE4B-95CE-6DB70DBA9567}" type="datetimeFigureOut">
               <a:rPr lang="en-US" smtClean="0"/>
               <a:pPr/>
-              <a:t>2/3/2015</a:t>
+              <a:t>2/4/2015</a:t>
             </a:fld>
             <a:endParaRPr lang="en-US" dirty="0"/>
           </a:p>
@@ -3301,7 +3302,7 @@
             <a:fld id="{B61BEF0D-F0BB-DE4B-95CE-6DB70DBA9567}" type="datetimeFigureOut">
               <a:rPr lang="en-US" smtClean="0"/>
               <a:pPr/>
-              <a:t>2/3/2015</a:t>
+              <a:t>2/4/2015</a:t>
             </a:fld>
             <a:endParaRPr lang="en-US" dirty="0"/>
           </a:p>
@@ -3483,7 +3484,7 @@
             <a:fld id="{B61BEF0D-F0BB-DE4B-95CE-6DB70DBA9567}" type="datetimeFigureOut">
               <a:rPr lang="en-US" smtClean="0"/>
               <a:pPr/>
-              <a:t>2/3/2015</a:t>
+              <a:t>2/4/2015</a:t>
             </a:fld>
             <a:endParaRPr lang="en-US" dirty="0"/>
           </a:p>
@@ -3774,7 +3775,7 @@
             <a:fld id="{B61BEF0D-F0BB-DE4B-95CE-6DB70DBA9567}" type="datetimeFigureOut">
               <a:rPr lang="en-US" smtClean="0"/>
               <a:pPr/>
-              <a:t>2/3/2015</a:t>
+              <a:t>2/4/2015</a:t>
             </a:fld>
             <a:endParaRPr lang="en-US" dirty="0"/>
           </a:p>
@@ -4018,7 +4019,7 @@
             <a:fld id="{B61BEF0D-F0BB-DE4B-95CE-6DB70DBA9567}" type="datetimeFigureOut">
               <a:rPr lang="en-US" smtClean="0"/>
               <a:pPr/>
-              <a:t>2/3/2015</a:t>
+              <a:t>2/4/2015</a:t>
             </a:fld>
             <a:endParaRPr lang="en-US" dirty="0"/>
           </a:p>
@@ -4399,7 +4400,7 @@
             <a:fld id="{B61BEF0D-F0BB-DE4B-95CE-6DB70DBA9567}" type="datetimeFigureOut">
               <a:rPr lang="en-US" smtClean="0"/>
               <a:pPr/>
-              <a:t>2/3/2015</a:t>
+              <a:t>2/4/2015</a:t>
             </a:fld>
             <a:endParaRPr lang="en-US" dirty="0"/>
           </a:p>
@@ -4519,7 +4520,7 @@
             <a:fld id="{B61BEF0D-F0BB-DE4B-95CE-6DB70DBA9567}" type="datetimeFigureOut">
               <a:rPr lang="en-US" smtClean="0"/>
               <a:pPr/>
-              <a:t>2/3/2015</a:t>
+              <a:t>2/4/2015</a:t>
             </a:fld>
             <a:endParaRPr lang="en-US" dirty="0"/>
           </a:p>
@@ -4616,7 +4617,7 @@
             <a:fld id="{B61BEF0D-F0BB-DE4B-95CE-6DB70DBA9567}" type="datetimeFigureOut">
               <a:rPr lang="en-US" smtClean="0"/>
               <a:pPr/>
-              <a:t>2/3/2015</a:t>
+              <a:t>2/4/2015</a:t>
             </a:fld>
             <a:endParaRPr lang="en-US" dirty="0"/>
           </a:p>
@@ -4867,7 +4868,7 @@
             <a:fld id="{B61BEF0D-F0BB-DE4B-95CE-6DB70DBA9567}" type="datetimeFigureOut">
               <a:rPr lang="en-US" smtClean="0"/>
               <a:pPr/>
-              <a:t>2/3/2015</a:t>
+              <a:t>2/4/2015</a:t>
             </a:fld>
             <a:endParaRPr lang="en-US" dirty="0"/>
           </a:p>
@@ -5126,7 +5127,7 @@
             <a:fld id="{B61BEF0D-F0BB-DE4B-95CE-6DB70DBA9567}" type="datetimeFigureOut">
               <a:rPr lang="en-US" smtClean="0"/>
               <a:pPr/>
-              <a:t>2/3/2015</a:t>
+              <a:t>2/4/2015</a:t>
             </a:fld>
             <a:endParaRPr lang="en-US" dirty="0"/>
           </a:p>
@@ -5371,7 +5372,7 @@
             <a:fld id="{B61BEF0D-F0BB-DE4B-95CE-6DB70DBA9567}" type="datetimeFigureOut">
               <a:rPr lang="en-US" smtClean="0"/>
               <a:pPr/>
-              <a:t>2/3/2015</a:t>
+              <a:t>2/4/2015</a:t>
             </a:fld>
             <a:endParaRPr lang="en-US" dirty="0"/>
           </a:p>
@@ -6220,121 +6221,25 @@
           <a:p>
             <a:r>
               <a:rPr lang="en-US" dirty="0"/>
-              <a:t>Team “Dubai” </a:t>
+              <a:t>Team “Dubai</a:t>
+            </a:r>
+            <a:r>
+              <a:rPr lang="en-US" dirty="0" smtClean="0"/>
+              <a:t>” – GAME SNAKE </a:t>
             </a:r>
             <a:endParaRPr lang="bg-BG" dirty="0"/>
-          </a:p>
-        </p:txBody>
-      </p:sp>
-      <p:sp>
-        <p:nvSpPr>
-          <p:cNvPr id="3" name="Content Placeholder 2"/>
-          <p:cNvSpPr>
-            <a:spLocks noGrp="1"/>
-          </p:cNvSpPr>
-          <p:nvPr>
-            <p:ph idx="1"/>
-          </p:nvPr>
-        </p:nvSpPr>
-        <p:spPr>
-          <a:xfrm>
-            <a:off x="341001" y="2024853"/>
-            <a:ext cx="10820400" cy="4024125"/>
-          </a:xfrm>
-        </p:spPr>
-        <p:txBody>
-          <a:bodyPr>
-            <a:normAutofit/>
-          </a:bodyPr>
-          <a:lstStyle/>
-          <a:p>
-            <a:pPr marL="0" indent="0">
-              <a:buNone/>
-            </a:pPr>
-            <a:r>
-              <a:rPr lang="en-US" sz="3000" b="1" dirty="0" smtClean="0">
-                <a:solidFill>
-                  <a:srgbClr val="FF3399"/>
-                </a:solidFill>
-              </a:rPr>
-              <a:t>Snake</a:t>
-            </a:r>
-            <a:r>
-              <a:rPr lang="en-US" sz="2300" dirty="0" smtClean="0">
-                <a:solidFill>
-                  <a:srgbClr val="FF3399"/>
-                </a:solidFill>
-              </a:rPr>
-              <a:t> </a:t>
-            </a:r>
-            <a:r>
-              <a:rPr lang="en-US" sz="2300" dirty="0" smtClean="0"/>
-              <a:t>is an </a:t>
-            </a:r>
-            <a:r>
-              <a:rPr lang="en-US" sz="2300" dirty="0" smtClean="0"/>
-              <a:t>old classic video game. It concept originated during the late 1970.</a:t>
-            </a:r>
-          </a:p>
-          <a:p>
-            <a:pPr marL="0" indent="0">
-              <a:buNone/>
-            </a:pPr>
-            <a:r>
-              <a:rPr lang="en-US" sz="2300" dirty="0" smtClean="0"/>
-              <a:t>Later it was programmed and for computers.</a:t>
-            </a:r>
-          </a:p>
-          <a:p>
-            <a:pPr marL="0" indent="0">
-              <a:buNone/>
-            </a:pPr>
-            <a:r>
-              <a:rPr lang="en-US" sz="2300" dirty="0" smtClean="0"/>
-              <a:t>The player controls the snake on the board plane. </a:t>
-            </a:r>
-          </a:p>
-          <a:p>
-            <a:pPr marL="0" indent="0">
-              <a:buNone/>
-            </a:pPr>
-            <a:r>
-              <a:rPr lang="en-US" sz="2300" dirty="0" smtClean="0"/>
-              <a:t>The object is to eat as much apples as possible running into them with the head of the snake. Each apple eaten makes the snake longer</a:t>
-            </a:r>
-            <a:r>
-              <a:rPr lang="bg-BG" sz="2300" dirty="0" smtClean="0"/>
-              <a:t>.</a:t>
-            </a:r>
-          </a:p>
-          <a:p>
-            <a:pPr marL="0" indent="0">
-              <a:buNone/>
-            </a:pPr>
-            <a:r>
-              <a:rPr lang="en-US" sz="2300" dirty="0" smtClean="0"/>
-              <a:t>While turning left/up/right/down  we hear sounds.</a:t>
-            </a:r>
-          </a:p>
-          <a:p>
-            <a:pPr marL="0" indent="0">
-              <a:buNone/>
-            </a:pPr>
-            <a:r>
-              <a:rPr lang="en-US" sz="2300" dirty="0" smtClean="0"/>
-              <a:t>The game is over when the snake hit the border of the board plane or itself.</a:t>
-            </a:r>
-            <a:endParaRPr lang="bg-BG" sz="2300" dirty="0"/>
           </a:p>
         </p:txBody>
       </p:sp>
       <p:pic>
         <p:nvPicPr>
-          <p:cNvPr id="5" name="Picture 4"/>
+          <p:cNvPr id="4" name="Content Placeholder 3"/>
           <p:cNvPicPr>
-            <a:picLocks noChangeAspect="1"/>
+            <a:picLocks noGrp="1" noChangeAspect="1"/>
           </p:cNvPicPr>
-          <p:nvPr/>
+          <p:nvPr>
+            <p:ph idx="1"/>
+          </p:nvPr>
         </p:nvPicPr>
         <p:blipFill>
           <a:blip r:embed="rId2">
@@ -6350,17 +6255,175 @@
         </p:blipFill>
         <p:spPr>
           <a:xfrm>
-            <a:off x="3407731" y="5952203"/>
-            <a:ext cx="493280" cy="493280"/>
-          </a:xfrm>
-          <a:prstGeom prst="rect">
-            <a:avLst/>
-          </a:prstGeom>
+            <a:off x="3534197" y="2193925"/>
+            <a:ext cx="5123606" cy="4024313"/>
+          </a:xfrm>
         </p:spPr>
       </p:pic>
+    </p:spTree>
+    <p:extLst>
+      <p:ext uri="{BB962C8B-B14F-4D97-AF65-F5344CB8AC3E}">
+        <p14:creationId xmlns:p14="http://schemas.microsoft.com/office/powerpoint/2010/main" val="1383995957"/>
+      </p:ext>
+    </p:extLst>
+  </p:cSld>
+  <p:clrMapOvr>
+    <a:masterClrMapping/>
+  </p:clrMapOvr>
+</p:sld>
+</file>
+
+<file path=ppt/slides/slide4.xml><?xml version="1.0" encoding="utf-8"?>
+<p:sld xmlns:a="http://schemas.openxmlformats.org/drawingml/2006/main" xmlns:r="http://schemas.openxmlformats.org/officeDocument/2006/relationships" xmlns:p="http://schemas.openxmlformats.org/presentationml/2006/main">
+  <p:cSld>
+    <p:spTree>
+      <p:nvGrpSpPr>
+        <p:cNvPr id="1" name=""/>
+        <p:cNvGrpSpPr/>
+        <p:nvPr/>
+      </p:nvGrpSpPr>
+      <p:grpSpPr>
+        <a:xfrm>
+          <a:off x="0" y="0"/>
+          <a:ext cx="0" cy="0"/>
+          <a:chOff x="0" y="0"/>
+          <a:chExt cx="0" cy="0"/>
+        </a:xfrm>
+      </p:grpSpPr>
+      <p:sp>
+        <p:nvSpPr>
+          <p:cNvPr id="2" name="Title 1"/>
+          <p:cNvSpPr>
+            <a:spLocks noGrp="1"/>
+          </p:cNvSpPr>
+          <p:nvPr>
+            <p:ph type="title"/>
+          </p:nvPr>
+        </p:nvSpPr>
+        <p:spPr/>
+        <p:txBody>
+          <a:bodyPr/>
+          <a:lstStyle/>
+          <a:p>
+            <a:r>
+              <a:rPr lang="en-US" dirty="0"/>
+              <a:t>Team “Dubai” </a:t>
+            </a:r>
+            <a:endParaRPr lang="bg-BG" dirty="0"/>
+          </a:p>
+        </p:txBody>
+      </p:sp>
+      <p:sp>
+        <p:nvSpPr>
+          <p:cNvPr id="3" name="Content Placeholder 2"/>
+          <p:cNvSpPr>
+            <a:spLocks noGrp="1"/>
+          </p:cNvSpPr>
+          <p:nvPr>
+            <p:ph idx="1"/>
+          </p:nvPr>
+        </p:nvSpPr>
+        <p:spPr>
+          <a:xfrm>
+            <a:off x="772280" y="2182754"/>
+            <a:ext cx="10820400" cy="4024125"/>
+          </a:xfrm>
+        </p:spPr>
+        <p:txBody>
+          <a:bodyPr>
+            <a:normAutofit/>
+          </a:bodyPr>
+          <a:lstStyle/>
+          <a:p>
+            <a:pPr marL="0" indent="0">
+              <a:buNone/>
+            </a:pPr>
+            <a:r>
+              <a:rPr lang="en-US" sz="2300" dirty="0"/>
+              <a:t>Repository URL - </a:t>
+            </a:r>
+            <a:r>
+              <a:rPr lang="en-US" sz="2300" dirty="0">
+                <a:hlinkClick r:id="rId2"/>
+              </a:rPr>
+              <a:t>https://github.com/krasimalakov/Java-Basic-Teamwork</a:t>
+            </a:r>
+            <a:endParaRPr lang="en-US" sz="2300" dirty="0" smtClean="0"/>
+          </a:p>
+          <a:p>
+            <a:pPr marL="0" indent="0">
+              <a:buNone/>
+            </a:pPr>
+            <a:endParaRPr lang="en-US" sz="2300" dirty="0"/>
+          </a:p>
+          <a:p>
+            <a:pPr marL="0" indent="0">
+              <a:buNone/>
+            </a:pPr>
+            <a:r>
+              <a:rPr lang="en-US" sz="2300" dirty="0" smtClean="0"/>
+              <a:t>Snake </a:t>
+            </a:r>
+            <a:r>
+              <a:rPr lang="en-US" sz="2300" dirty="0" smtClean="0"/>
+              <a:t>is old classic video game. It concept originated during the late 1970.</a:t>
+            </a:r>
+          </a:p>
+          <a:p>
+            <a:pPr marL="0" indent="0">
+              <a:buNone/>
+            </a:pPr>
+            <a:r>
+              <a:rPr lang="en-US" sz="2300" dirty="0" smtClean="0"/>
+              <a:t>Later it was programmed and for computers.</a:t>
+            </a:r>
+          </a:p>
+          <a:p>
+            <a:pPr marL="0" indent="0">
+              <a:buNone/>
+            </a:pPr>
+            <a:r>
+              <a:rPr lang="en-US" sz="2300" dirty="0" smtClean="0"/>
+              <a:t>The player controls the snake on the board plane. </a:t>
+            </a:r>
+          </a:p>
+          <a:p>
+            <a:pPr marL="0" indent="0">
+              <a:buNone/>
+            </a:pPr>
+            <a:r>
+              <a:rPr lang="en-US" sz="2300" dirty="0" smtClean="0"/>
+              <a:t>The object is to eat as much apples as possible running into them with the head of the snake. Each apple eaten makes the snake longer</a:t>
+            </a:r>
+            <a:r>
+              <a:rPr lang="bg-BG" sz="2300" dirty="0" smtClean="0"/>
+              <a:t>.</a:t>
+            </a:r>
+          </a:p>
+          <a:p>
+            <a:pPr marL="0" indent="0">
+              <a:buNone/>
+            </a:pPr>
+            <a:r>
+              <a:rPr lang="en-US" sz="2300" dirty="0" smtClean="0"/>
+              <a:t>While turning left/up/right/down  we hear sounds.</a:t>
+            </a:r>
+          </a:p>
+          <a:p>
+            <a:pPr marL="0" indent="0">
+              <a:buNone/>
+            </a:pPr>
+            <a:r>
+              <a:rPr lang="en-US" sz="2300" dirty="0" smtClean="0"/>
+              <a:t>The game is over when the snake hit the border of the board plane or itself.</a:t>
+            </a:r>
+            <a:endParaRPr lang="bg-BG" sz="2300" dirty="0"/>
+          </a:p>
+        </p:txBody>
+      </p:sp>
       <p:pic>
         <p:nvPicPr>
-          <p:cNvPr id="6" name="Picture 5"/>
+          <p:cNvPr id="5" name="Picture 4"/>
           <p:cNvPicPr>
             <a:picLocks noChangeAspect="1"/>
           </p:cNvPicPr>
@@ -6380,8 +6443,8 @@
         </p:blipFill>
         <p:spPr>
           <a:xfrm>
-            <a:off x="536385" y="6023667"/>
-            <a:ext cx="390035" cy="390035"/>
+            <a:off x="3362719" y="6314797"/>
+            <a:ext cx="493280" cy="493280"/>
           </a:xfrm>
           <a:prstGeom prst="rect">
             <a:avLst/>
@@ -6390,7 +6453,7 @@
       </p:pic>
       <p:pic>
         <p:nvPicPr>
-          <p:cNvPr id="7" name="Picture 6"/>
+          <p:cNvPr id="6" name="Picture 5"/>
           <p:cNvPicPr>
             <a:picLocks noChangeAspect="1"/>
           </p:cNvPicPr>
@@ -6410,7 +6473,37 @@
         </p:blipFill>
         <p:spPr>
           <a:xfrm>
-            <a:off x="2395413" y="6091271"/>
+            <a:off x="504970" y="6332232"/>
+            <a:ext cx="390035" cy="390035"/>
+          </a:xfrm>
+          <a:prstGeom prst="rect">
+            <a:avLst/>
+          </a:prstGeom>
+        </p:spPr>
+      </p:pic>
+      <p:pic>
+        <p:nvPicPr>
+          <p:cNvPr id="7" name="Picture 6"/>
+          <p:cNvPicPr>
+            <a:picLocks noChangeAspect="1"/>
+          </p:cNvPicPr>
+          <p:nvPr/>
+        </p:nvPicPr>
+        <p:blipFill>
+          <a:blip r:embed="rId5">
+            <a:extLst>
+              <a:ext uri="{28A0092B-C50C-407E-A947-70E740481C1C}">
+                <a14:useLocalDpi xmlns:a14="http://schemas.microsoft.com/office/drawing/2010/main" val="0"/>
+              </a:ext>
+            </a:extLst>
+          </a:blip>
+          <a:stretch>
+            <a:fillRect/>
+          </a:stretch>
+        </p:blipFill>
+        <p:spPr>
+          <a:xfrm>
+            <a:off x="2363998" y="6399836"/>
             <a:ext cx="438843" cy="438843"/>
           </a:xfrm>
           <a:prstGeom prst="rect">
@@ -6421,6 +6514,126 @@
       <p:pic>
         <p:nvPicPr>
           <p:cNvPr id="8" name="Picture 7"/>
+          <p:cNvPicPr>
+            <a:picLocks noChangeAspect="1"/>
+          </p:cNvPicPr>
+          <p:nvPr/>
+        </p:nvPicPr>
+        <p:blipFill>
+          <a:blip r:embed="rId4">
+            <a:extLst>
+              <a:ext uri="{28A0092B-C50C-407E-A947-70E740481C1C}">
+                <a14:useLocalDpi xmlns:a14="http://schemas.microsoft.com/office/drawing/2010/main" val="0"/>
+              </a:ext>
+            </a:extLst>
+          </a:blip>
+          <a:stretch>
+            <a:fillRect/>
+          </a:stretch>
+        </p:blipFill>
+        <p:spPr>
+          <a:xfrm>
+            <a:off x="897694" y="6320427"/>
+            <a:ext cx="390035" cy="390035"/>
+          </a:xfrm>
+          <a:prstGeom prst="rect">
+            <a:avLst/>
+          </a:prstGeom>
+        </p:spPr>
+      </p:pic>
+      <p:pic>
+        <p:nvPicPr>
+          <p:cNvPr id="9" name="Picture 8"/>
+          <p:cNvPicPr>
+            <a:picLocks noChangeAspect="1"/>
+          </p:cNvPicPr>
+          <p:nvPr/>
+        </p:nvPicPr>
+        <p:blipFill>
+          <a:blip r:embed="rId4">
+            <a:extLst>
+              <a:ext uri="{28A0092B-C50C-407E-A947-70E740481C1C}">
+                <a14:useLocalDpi xmlns:a14="http://schemas.microsoft.com/office/drawing/2010/main" val="0"/>
+              </a:ext>
+            </a:extLst>
+          </a:blip>
+          <a:stretch>
+            <a:fillRect/>
+          </a:stretch>
+        </p:blipFill>
+        <p:spPr>
+          <a:xfrm>
+            <a:off x="1271012" y="6320427"/>
+            <a:ext cx="390035" cy="390035"/>
+          </a:xfrm>
+          <a:prstGeom prst="rect">
+            <a:avLst/>
+          </a:prstGeom>
+        </p:spPr>
+      </p:pic>
+      <p:pic>
+        <p:nvPicPr>
+          <p:cNvPr id="10" name="Picture 9"/>
+          <p:cNvPicPr>
+            <a:picLocks noChangeAspect="1"/>
+          </p:cNvPicPr>
+          <p:nvPr/>
+        </p:nvPicPr>
+        <p:blipFill>
+          <a:blip r:embed="rId4">
+            <a:extLst>
+              <a:ext uri="{28A0092B-C50C-407E-A947-70E740481C1C}">
+                <a14:useLocalDpi xmlns:a14="http://schemas.microsoft.com/office/drawing/2010/main" val="0"/>
+              </a:ext>
+            </a:extLst>
+          </a:blip>
+          <a:stretch>
+            <a:fillRect/>
+          </a:stretch>
+        </p:blipFill>
+        <p:spPr>
+          <a:xfrm>
+            <a:off x="1644330" y="6325421"/>
+            <a:ext cx="390035" cy="390035"/>
+          </a:xfrm>
+          <a:prstGeom prst="rect">
+            <a:avLst/>
+          </a:prstGeom>
+        </p:spPr>
+      </p:pic>
+      <p:pic>
+        <p:nvPicPr>
+          <p:cNvPr id="11" name="Picture 10"/>
+          <p:cNvPicPr>
+            <a:picLocks noChangeAspect="1"/>
+          </p:cNvPicPr>
+          <p:nvPr/>
+        </p:nvPicPr>
+        <p:blipFill>
+          <a:blip r:embed="rId4">
+            <a:extLst>
+              <a:ext uri="{28A0092B-C50C-407E-A947-70E740481C1C}">
+                <a14:useLocalDpi xmlns:a14="http://schemas.microsoft.com/office/drawing/2010/main" val="0"/>
+              </a:ext>
+            </a:extLst>
+          </a:blip>
+          <a:stretch>
+            <a:fillRect/>
+          </a:stretch>
+        </p:blipFill>
+        <p:spPr>
+          <a:xfrm>
+            <a:off x="2010568" y="6332232"/>
+            <a:ext cx="390035" cy="390035"/>
+          </a:xfrm>
+          <a:prstGeom prst="rect">
+            <a:avLst/>
+          </a:prstGeom>
+        </p:spPr>
+      </p:pic>
+      <p:pic>
+        <p:nvPicPr>
+          <p:cNvPr id="12" name="Picture 11"/>
           <p:cNvPicPr>
             <a:picLocks noChangeAspect="1"/>
           </p:cNvPicPr>
@@ -6440,8 +6653,8 @@
         </p:blipFill>
         <p:spPr>
           <a:xfrm>
-            <a:off x="929109" y="6011862"/>
-            <a:ext cx="390035" cy="390035"/>
+            <a:off x="5955132" y="316909"/>
+            <a:ext cx="493280" cy="493280"/>
           </a:xfrm>
           <a:prstGeom prst="rect">
             <a:avLst/>
@@ -6450,7 +6663,187 @@
       </p:pic>
       <p:pic>
         <p:nvPicPr>
-          <p:cNvPr id="9" name="Picture 8"/>
+          <p:cNvPr id="13" name="Picture 12"/>
+          <p:cNvPicPr>
+            <a:picLocks noChangeAspect="1"/>
+          </p:cNvPicPr>
+          <p:nvPr/>
+        </p:nvPicPr>
+        <p:blipFill>
+          <a:blip r:embed="rId4">
+            <a:extLst>
+              <a:ext uri="{28A0092B-C50C-407E-A947-70E740481C1C}">
+                <a14:useLocalDpi xmlns:a14="http://schemas.microsoft.com/office/drawing/2010/main" val="0"/>
+              </a:ext>
+            </a:extLst>
+          </a:blip>
+          <a:stretch>
+            <a:fillRect/>
+          </a:stretch>
+        </p:blipFill>
+        <p:spPr>
+          <a:xfrm>
+            <a:off x="4932501" y="1804525"/>
+            <a:ext cx="390035" cy="390035"/>
+          </a:xfrm>
+          <a:prstGeom prst="rect">
+            <a:avLst/>
+          </a:prstGeom>
+        </p:spPr>
+      </p:pic>
+      <p:pic>
+        <p:nvPicPr>
+          <p:cNvPr id="15" name="Picture 14"/>
+          <p:cNvPicPr>
+            <a:picLocks noChangeAspect="1"/>
+          </p:cNvPicPr>
+          <p:nvPr/>
+        </p:nvPicPr>
+        <p:blipFill>
+          <a:blip r:embed="rId4">
+            <a:extLst>
+              <a:ext uri="{28A0092B-C50C-407E-A947-70E740481C1C}">
+                <a14:useLocalDpi xmlns:a14="http://schemas.microsoft.com/office/drawing/2010/main" val="0"/>
+              </a:ext>
+            </a:extLst>
+          </a:blip>
+          <a:stretch>
+            <a:fillRect/>
+          </a:stretch>
+        </p:blipFill>
+        <p:spPr>
+          <a:xfrm>
+            <a:off x="5325225" y="1792720"/>
+            <a:ext cx="390035" cy="390035"/>
+          </a:xfrm>
+          <a:prstGeom prst="rect">
+            <a:avLst/>
+          </a:prstGeom>
+        </p:spPr>
+      </p:pic>
+      <p:pic>
+        <p:nvPicPr>
+          <p:cNvPr id="16" name="Picture 15"/>
+          <p:cNvPicPr>
+            <a:picLocks noChangeAspect="1"/>
+          </p:cNvPicPr>
+          <p:nvPr/>
+        </p:nvPicPr>
+        <p:blipFill>
+          <a:blip r:embed="rId4">
+            <a:extLst>
+              <a:ext uri="{28A0092B-C50C-407E-A947-70E740481C1C}">
+                <a14:useLocalDpi xmlns:a14="http://schemas.microsoft.com/office/drawing/2010/main" val="0"/>
+              </a:ext>
+            </a:extLst>
+          </a:blip>
+          <a:stretch>
+            <a:fillRect/>
+          </a:stretch>
+        </p:blipFill>
+        <p:spPr>
+          <a:xfrm>
+            <a:off x="5698543" y="1792720"/>
+            <a:ext cx="390035" cy="390035"/>
+          </a:xfrm>
+          <a:prstGeom prst="rect">
+            <a:avLst/>
+          </a:prstGeom>
+        </p:spPr>
+      </p:pic>
+      <p:pic>
+        <p:nvPicPr>
+          <p:cNvPr id="17" name="Picture 16"/>
+          <p:cNvPicPr>
+            <a:picLocks noChangeAspect="1"/>
+          </p:cNvPicPr>
+          <p:nvPr/>
+        </p:nvPicPr>
+        <p:blipFill>
+          <a:blip r:embed="rId4">
+            <a:extLst>
+              <a:ext uri="{28A0092B-C50C-407E-A947-70E740481C1C}">
+                <a14:useLocalDpi xmlns:a14="http://schemas.microsoft.com/office/drawing/2010/main" val="0"/>
+              </a:ext>
+            </a:extLst>
+          </a:blip>
+          <a:stretch>
+            <a:fillRect/>
+          </a:stretch>
+        </p:blipFill>
+        <p:spPr>
+          <a:xfrm>
+            <a:off x="6071861" y="1797714"/>
+            <a:ext cx="390035" cy="390035"/>
+          </a:xfrm>
+          <a:prstGeom prst="rect">
+            <a:avLst/>
+          </a:prstGeom>
+        </p:spPr>
+      </p:pic>
+      <p:pic>
+        <p:nvPicPr>
+          <p:cNvPr id="18" name="Picture 17"/>
+          <p:cNvPicPr>
+            <a:picLocks noChangeAspect="1"/>
+          </p:cNvPicPr>
+          <p:nvPr/>
+        </p:nvPicPr>
+        <p:blipFill>
+          <a:blip r:embed="rId4">
+            <a:extLst>
+              <a:ext uri="{28A0092B-C50C-407E-A947-70E740481C1C}">
+                <a14:useLocalDpi xmlns:a14="http://schemas.microsoft.com/office/drawing/2010/main" val="0"/>
+              </a:ext>
+            </a:extLst>
+          </a:blip>
+          <a:stretch>
+            <a:fillRect/>
+          </a:stretch>
+        </p:blipFill>
+        <p:spPr>
+          <a:xfrm>
+            <a:off x="6058377" y="1474846"/>
+            <a:ext cx="390035" cy="390035"/>
+          </a:xfrm>
+          <a:prstGeom prst="rect">
+            <a:avLst/>
+          </a:prstGeom>
+        </p:spPr>
+      </p:pic>
+      <p:pic>
+        <p:nvPicPr>
+          <p:cNvPr id="19" name="Picture 18"/>
+          <p:cNvPicPr>
+            <a:picLocks noChangeAspect="1"/>
+          </p:cNvPicPr>
+          <p:nvPr/>
+        </p:nvPicPr>
+        <p:blipFill>
+          <a:blip r:embed="rId6">
+            <a:extLst>
+              <a:ext uri="{28A0092B-C50C-407E-A947-70E740481C1C}">
+                <a14:useLocalDpi xmlns:a14="http://schemas.microsoft.com/office/drawing/2010/main" val="0"/>
+              </a:ext>
+            </a:extLst>
+          </a:blip>
+          <a:stretch>
+            <a:fillRect/>
+          </a:stretch>
+        </p:blipFill>
+        <p:spPr>
+          <a:xfrm>
+            <a:off x="6096000" y="1196168"/>
+            <a:ext cx="478881" cy="478881"/>
+          </a:xfrm>
+          <a:prstGeom prst="rect">
+            <a:avLst/>
+          </a:prstGeom>
+        </p:spPr>
+      </p:pic>
+      <p:pic>
+        <p:nvPicPr>
+          <p:cNvPr id="20" name="Picture 19"/>
           <p:cNvPicPr>
             <a:picLocks noChangeAspect="1"/>
           </p:cNvPicPr>
@@ -6470,8 +6863,8 @@
         </p:blipFill>
         <p:spPr>
           <a:xfrm>
-            <a:off x="1302427" y="6011862"/>
-            <a:ext cx="390035" cy="390035"/>
+            <a:off x="8432857" y="6091887"/>
+            <a:ext cx="493280" cy="493280"/>
           </a:xfrm>
           <a:prstGeom prst="rect">
             <a:avLst/>
@@ -6480,14 +6873,14 @@
       </p:pic>
       <p:pic>
         <p:nvPicPr>
-          <p:cNvPr id="10" name="Picture 9"/>
+          <p:cNvPr id="21" name="Picture 20"/>
           <p:cNvPicPr>
             <a:picLocks noChangeAspect="1"/>
           </p:cNvPicPr>
           <p:nvPr/>
         </p:nvPicPr>
         <p:blipFill>
-          <a:blip r:embed="rId3">
+          <a:blip r:embed="rId4">
             <a:extLst>
               <a:ext uri="{28A0092B-C50C-407E-A947-70E740481C1C}">
                 <a14:useLocalDpi xmlns:a14="http://schemas.microsoft.com/office/drawing/2010/main" val="0"/>
@@ -6500,7 +6893,7 @@
         </p:blipFill>
         <p:spPr>
           <a:xfrm>
-            <a:off x="1675745" y="6016856"/>
+            <a:off x="11747183" y="5151248"/>
             <a:ext cx="390035" cy="390035"/>
           </a:xfrm>
           <a:prstGeom prst="rect">
@@ -6510,14 +6903,14 @@
       </p:pic>
       <p:pic>
         <p:nvPicPr>
-          <p:cNvPr id="11" name="Picture 10"/>
+          <p:cNvPr id="23" name="Picture 22"/>
           <p:cNvPicPr>
             <a:picLocks noChangeAspect="1"/>
           </p:cNvPicPr>
           <p:nvPr/>
         </p:nvPicPr>
         <p:blipFill>
-          <a:blip r:embed="rId3">
+          <a:blip r:embed="rId4">
             <a:extLst>
               <a:ext uri="{28A0092B-C50C-407E-A947-70E740481C1C}">
                 <a14:useLocalDpi xmlns:a14="http://schemas.microsoft.com/office/drawing/2010/main" val="0"/>
@@ -6530,7 +6923,7 @@
         </p:blipFill>
         <p:spPr>
           <a:xfrm>
-            <a:off x="2041983" y="6023667"/>
+            <a:off x="11747183" y="5483425"/>
             <a:ext cx="390035" cy="390035"/>
           </a:xfrm>
           <a:prstGeom prst="rect">
@@ -6540,14 +6933,14 @@
       </p:pic>
       <p:pic>
         <p:nvPicPr>
-          <p:cNvPr id="12" name="Picture 11"/>
+          <p:cNvPr id="24" name="Picture 23"/>
           <p:cNvPicPr>
             <a:picLocks noChangeAspect="1"/>
           </p:cNvPicPr>
           <p:nvPr/>
         </p:nvPicPr>
         <p:blipFill>
-          <a:blip r:embed="rId2">
+          <a:blip r:embed="rId4">
             <a:extLst>
               <a:ext uri="{28A0092B-C50C-407E-A947-70E740481C1C}">
                 <a14:useLocalDpi xmlns:a14="http://schemas.microsoft.com/office/drawing/2010/main" val="0"/>
@@ -6560,8 +6953,8 @@
         </p:blipFill>
         <p:spPr>
           <a:xfrm>
-            <a:off x="5955132" y="316909"/>
-            <a:ext cx="493280" cy="493280"/>
+            <a:off x="11747183" y="5801959"/>
+            <a:ext cx="390035" cy="390035"/>
           </a:xfrm>
           <a:prstGeom prst="rect">
             <a:avLst/>
@@ -6570,14 +6963,14 @@
       </p:pic>
       <p:pic>
         <p:nvPicPr>
-          <p:cNvPr id="13" name="Picture 12"/>
+          <p:cNvPr id="25" name="Picture 24"/>
           <p:cNvPicPr>
             <a:picLocks noChangeAspect="1"/>
           </p:cNvPicPr>
           <p:nvPr/>
         </p:nvPicPr>
         <p:blipFill>
-          <a:blip r:embed="rId3">
+          <a:blip r:embed="rId4">
             <a:extLst>
               <a:ext uri="{28A0092B-C50C-407E-A947-70E740481C1C}">
                 <a14:useLocalDpi xmlns:a14="http://schemas.microsoft.com/office/drawing/2010/main" val="0"/>
@@ -6590,7 +6983,7 @@
         </p:blipFill>
         <p:spPr>
           <a:xfrm>
-            <a:off x="4932501" y="1804525"/>
+            <a:off x="11744267" y="6120126"/>
             <a:ext cx="390035" cy="390035"/>
           </a:xfrm>
           <a:prstGeom prst="rect">
@@ -6600,14 +6993,14 @@
       </p:pic>
       <p:pic>
         <p:nvPicPr>
-          <p:cNvPr id="15" name="Picture 14"/>
+          <p:cNvPr id="26" name="Picture 25"/>
           <p:cNvPicPr>
             <a:picLocks noChangeAspect="1"/>
           </p:cNvPicPr>
           <p:nvPr/>
         </p:nvPicPr>
         <p:blipFill>
-          <a:blip r:embed="rId3">
+          <a:blip r:embed="rId4">
             <a:extLst>
               <a:ext uri="{28A0092B-C50C-407E-A947-70E740481C1C}">
                 <a14:useLocalDpi xmlns:a14="http://schemas.microsoft.com/office/drawing/2010/main" val="0"/>
@@ -6620,7 +7013,7 @@
         </p:blipFill>
         <p:spPr>
           <a:xfrm>
-            <a:off x="5325225" y="1792720"/>
+            <a:off x="11410497" y="6146901"/>
             <a:ext cx="390035" cy="390035"/>
           </a:xfrm>
           <a:prstGeom prst="rect">
@@ -6630,14 +7023,14 @@
       </p:pic>
       <p:pic>
         <p:nvPicPr>
-          <p:cNvPr id="16" name="Picture 15"/>
+          <p:cNvPr id="27" name="Picture 26"/>
           <p:cNvPicPr>
             <a:picLocks noChangeAspect="1"/>
           </p:cNvPicPr>
           <p:nvPr/>
         </p:nvPicPr>
         <p:blipFill>
-          <a:blip r:embed="rId3">
+          <a:blip r:embed="rId7">
             <a:extLst>
               <a:ext uri="{28A0092B-C50C-407E-A947-70E740481C1C}">
                 <a14:useLocalDpi xmlns:a14="http://schemas.microsoft.com/office/drawing/2010/main" val="0"/>
@@ -6650,8 +7043,8 @@
         </p:blipFill>
         <p:spPr>
           <a:xfrm>
-            <a:off x="5698543" y="1792720"/>
-            <a:ext cx="390035" cy="390035"/>
+            <a:off x="11093757" y="6198705"/>
+            <a:ext cx="511757" cy="511757"/>
           </a:xfrm>
           <a:prstGeom prst="rect">
             <a:avLst/>
@@ -6660,14 +7053,14 @@
       </p:pic>
       <p:pic>
         <p:nvPicPr>
-          <p:cNvPr id="17" name="Picture 16"/>
+          <p:cNvPr id="28" name="Picture 27"/>
           <p:cNvPicPr>
             <a:picLocks noChangeAspect="1"/>
           </p:cNvPicPr>
           <p:nvPr/>
         </p:nvPicPr>
         <p:blipFill>
-          <a:blip r:embed="rId3">
+          <a:blip r:embed="rId4">
             <a:extLst>
               <a:ext uri="{28A0092B-C50C-407E-A947-70E740481C1C}">
                 <a14:useLocalDpi xmlns:a14="http://schemas.microsoft.com/office/drawing/2010/main" val="0"/>
@@ -6680,7 +7073,7 @@
         </p:blipFill>
         <p:spPr>
           <a:xfrm>
-            <a:off x="6071861" y="1797714"/>
+            <a:off x="11737826" y="4812563"/>
             <a:ext cx="390035" cy="390035"/>
           </a:xfrm>
           <a:prstGeom prst="rect">
@@ -6690,14 +7083,14 @@
       </p:pic>
       <p:pic>
         <p:nvPicPr>
-          <p:cNvPr id="18" name="Picture 17"/>
+          <p:cNvPr id="29" name="Picture 28"/>
           <p:cNvPicPr>
             <a:picLocks noChangeAspect="1"/>
           </p:cNvPicPr>
           <p:nvPr/>
         </p:nvPicPr>
         <p:blipFill>
-          <a:blip r:embed="rId3">
+          <a:blip r:embed="rId4">
             <a:extLst>
               <a:ext uri="{28A0092B-C50C-407E-A947-70E740481C1C}">
                 <a14:useLocalDpi xmlns:a14="http://schemas.microsoft.com/office/drawing/2010/main" val="0"/>
@@ -6710,7 +7103,7 @@
         </p:blipFill>
         <p:spPr>
           <a:xfrm>
-            <a:off x="6058377" y="1474846"/>
+            <a:off x="11728469" y="4466735"/>
             <a:ext cx="390035" cy="390035"/>
           </a:xfrm>
           <a:prstGeom prst="rect">
@@ -6720,14 +7113,14 @@
       </p:pic>
       <p:pic>
         <p:nvPicPr>
-          <p:cNvPr id="19" name="Picture 18"/>
+          <p:cNvPr id="30" name="Picture 29"/>
           <p:cNvPicPr>
             <a:picLocks noChangeAspect="1"/>
           </p:cNvPicPr>
           <p:nvPr/>
         </p:nvPicPr>
         <p:blipFill>
-          <a:blip r:embed="rId5">
+          <a:blip r:embed="rId4">
             <a:extLst>
               <a:ext uri="{28A0092B-C50C-407E-A947-70E740481C1C}">
                 <a14:useLocalDpi xmlns:a14="http://schemas.microsoft.com/office/drawing/2010/main" val="0"/>
@@ -6740,307 +7133,7 @@
         </p:blipFill>
         <p:spPr>
           <a:xfrm>
-            <a:off x="6096000" y="1196168"/>
-            <a:ext cx="478881" cy="478881"/>
-          </a:xfrm>
-          <a:prstGeom prst="rect">
-            <a:avLst/>
-          </a:prstGeom>
-        </p:spPr>
-      </p:pic>
-      <p:pic>
-        <p:nvPicPr>
-          <p:cNvPr id="20" name="Picture 19"/>
-          <p:cNvPicPr>
-            <a:picLocks noChangeAspect="1"/>
-          </p:cNvPicPr>
-          <p:nvPr/>
-        </p:nvPicPr>
-        <p:blipFill>
-          <a:blip r:embed="rId2">
-            <a:extLst>
-              <a:ext uri="{28A0092B-C50C-407E-A947-70E740481C1C}">
-                <a14:useLocalDpi xmlns:a14="http://schemas.microsoft.com/office/drawing/2010/main" val="0"/>
-              </a:ext>
-            </a:extLst>
-          </a:blip>
-          <a:stretch>
-            <a:fillRect/>
-          </a:stretch>
-        </p:blipFill>
-        <p:spPr>
-          <a:xfrm>
-            <a:off x="9741564" y="5511283"/>
-            <a:ext cx="493280" cy="493280"/>
-          </a:xfrm>
-          <a:prstGeom prst="rect">
-            <a:avLst/>
-          </a:prstGeom>
-        </p:spPr>
-      </p:pic>
-      <p:pic>
-        <p:nvPicPr>
-          <p:cNvPr id="21" name="Picture 20"/>
-          <p:cNvPicPr>
-            <a:picLocks noChangeAspect="1"/>
-          </p:cNvPicPr>
-          <p:nvPr/>
-        </p:nvPicPr>
-        <p:blipFill>
-          <a:blip r:embed="rId3">
-            <a:extLst>
-              <a:ext uri="{28A0092B-C50C-407E-A947-70E740481C1C}">
-                <a14:useLocalDpi xmlns:a14="http://schemas.microsoft.com/office/drawing/2010/main" val="0"/>
-              </a:ext>
-            </a:extLst>
-          </a:blip>
-          <a:stretch>
-            <a:fillRect/>
-          </a:stretch>
-        </p:blipFill>
-        <p:spPr>
-          <a:xfrm>
-            <a:off x="11761760" y="4594028"/>
-            <a:ext cx="390035" cy="390035"/>
-          </a:xfrm>
-          <a:prstGeom prst="rect">
-            <a:avLst/>
-          </a:prstGeom>
-        </p:spPr>
-      </p:pic>
-      <p:pic>
-        <p:nvPicPr>
-          <p:cNvPr id="23" name="Picture 22"/>
-          <p:cNvPicPr>
-            <a:picLocks noChangeAspect="1"/>
-          </p:cNvPicPr>
-          <p:nvPr/>
-        </p:nvPicPr>
-        <p:blipFill>
-          <a:blip r:embed="rId3">
-            <a:extLst>
-              <a:ext uri="{28A0092B-C50C-407E-A947-70E740481C1C}">
-                <a14:useLocalDpi xmlns:a14="http://schemas.microsoft.com/office/drawing/2010/main" val="0"/>
-              </a:ext>
-            </a:extLst>
-          </a:blip>
-          <a:stretch>
-            <a:fillRect/>
-          </a:stretch>
-        </p:blipFill>
-        <p:spPr>
-          <a:xfrm>
-            <a:off x="11761760" y="4926205"/>
-            <a:ext cx="390035" cy="390035"/>
-          </a:xfrm>
-          <a:prstGeom prst="rect">
-            <a:avLst/>
-          </a:prstGeom>
-        </p:spPr>
-      </p:pic>
-      <p:pic>
-        <p:nvPicPr>
-          <p:cNvPr id="24" name="Picture 23"/>
-          <p:cNvPicPr>
-            <a:picLocks noChangeAspect="1"/>
-          </p:cNvPicPr>
-          <p:nvPr/>
-        </p:nvPicPr>
-        <p:blipFill>
-          <a:blip r:embed="rId3">
-            <a:extLst>
-              <a:ext uri="{28A0092B-C50C-407E-A947-70E740481C1C}">
-                <a14:useLocalDpi xmlns:a14="http://schemas.microsoft.com/office/drawing/2010/main" val="0"/>
-              </a:ext>
-            </a:extLst>
-          </a:blip>
-          <a:stretch>
-            <a:fillRect/>
-          </a:stretch>
-        </p:blipFill>
-        <p:spPr>
-          <a:xfrm>
-            <a:off x="11761760" y="5244739"/>
-            <a:ext cx="390035" cy="390035"/>
-          </a:xfrm>
-          <a:prstGeom prst="rect">
-            <a:avLst/>
-          </a:prstGeom>
-        </p:spPr>
-      </p:pic>
-      <p:pic>
-        <p:nvPicPr>
-          <p:cNvPr id="25" name="Picture 24"/>
-          <p:cNvPicPr>
-            <a:picLocks noChangeAspect="1"/>
-          </p:cNvPicPr>
-          <p:nvPr/>
-        </p:nvPicPr>
-        <p:blipFill>
-          <a:blip r:embed="rId3">
-            <a:extLst>
-              <a:ext uri="{28A0092B-C50C-407E-A947-70E740481C1C}">
-                <a14:useLocalDpi xmlns:a14="http://schemas.microsoft.com/office/drawing/2010/main" val="0"/>
-              </a:ext>
-            </a:extLst>
-          </a:blip>
-          <a:stretch>
-            <a:fillRect/>
-          </a:stretch>
-        </p:blipFill>
-        <p:spPr>
-          <a:xfrm>
-            <a:off x="11758844" y="5562906"/>
-            <a:ext cx="390035" cy="390035"/>
-          </a:xfrm>
-          <a:prstGeom prst="rect">
-            <a:avLst/>
-          </a:prstGeom>
-        </p:spPr>
-      </p:pic>
-      <p:pic>
-        <p:nvPicPr>
-          <p:cNvPr id="26" name="Picture 25"/>
-          <p:cNvPicPr>
-            <a:picLocks noChangeAspect="1"/>
-          </p:cNvPicPr>
-          <p:nvPr/>
-        </p:nvPicPr>
-        <p:blipFill>
-          <a:blip r:embed="rId3">
-            <a:extLst>
-              <a:ext uri="{28A0092B-C50C-407E-A947-70E740481C1C}">
-                <a14:useLocalDpi xmlns:a14="http://schemas.microsoft.com/office/drawing/2010/main" val="0"/>
-              </a:ext>
-            </a:extLst>
-          </a:blip>
-          <a:stretch>
-            <a:fillRect/>
-          </a:stretch>
-        </p:blipFill>
-        <p:spPr>
-          <a:xfrm>
-            <a:off x="11425074" y="5589681"/>
-            <a:ext cx="390035" cy="390035"/>
-          </a:xfrm>
-          <a:prstGeom prst="rect">
-            <a:avLst/>
-          </a:prstGeom>
-        </p:spPr>
-      </p:pic>
-      <p:pic>
-        <p:nvPicPr>
-          <p:cNvPr id="27" name="Picture 26"/>
-          <p:cNvPicPr>
-            <a:picLocks noChangeAspect="1"/>
-          </p:cNvPicPr>
-          <p:nvPr/>
-        </p:nvPicPr>
-        <p:blipFill>
-          <a:blip r:embed="rId6">
-            <a:extLst>
-              <a:ext uri="{28A0092B-C50C-407E-A947-70E740481C1C}">
-                <a14:useLocalDpi xmlns:a14="http://schemas.microsoft.com/office/drawing/2010/main" val="0"/>
-              </a:ext>
-            </a:extLst>
-          </a:blip>
-          <a:stretch>
-            <a:fillRect/>
-          </a:stretch>
-        </p:blipFill>
-        <p:spPr>
-          <a:xfrm>
-            <a:off x="11130701" y="5629384"/>
-            <a:ext cx="511757" cy="511757"/>
-          </a:xfrm>
-          <a:prstGeom prst="rect">
-            <a:avLst/>
-          </a:prstGeom>
-        </p:spPr>
-      </p:pic>
-      <p:pic>
-        <p:nvPicPr>
-          <p:cNvPr id="28" name="Picture 27"/>
-          <p:cNvPicPr>
-            <a:picLocks noChangeAspect="1"/>
-          </p:cNvPicPr>
-          <p:nvPr/>
-        </p:nvPicPr>
-        <p:blipFill>
-          <a:blip r:embed="rId3">
-            <a:extLst>
-              <a:ext uri="{28A0092B-C50C-407E-A947-70E740481C1C}">
-                <a14:useLocalDpi xmlns:a14="http://schemas.microsoft.com/office/drawing/2010/main" val="0"/>
-              </a:ext>
-            </a:extLst>
-          </a:blip>
-          <a:stretch>
-            <a:fillRect/>
-          </a:stretch>
-        </p:blipFill>
-        <p:spPr>
-          <a:xfrm>
-            <a:off x="11752403" y="4255343"/>
-            <a:ext cx="390035" cy="390035"/>
-          </a:xfrm>
-          <a:prstGeom prst="rect">
-            <a:avLst/>
-          </a:prstGeom>
-        </p:spPr>
-      </p:pic>
-      <p:pic>
-        <p:nvPicPr>
-          <p:cNvPr id="29" name="Picture 28"/>
-          <p:cNvPicPr>
-            <a:picLocks noChangeAspect="1"/>
-          </p:cNvPicPr>
-          <p:nvPr/>
-        </p:nvPicPr>
-        <p:blipFill>
-          <a:blip r:embed="rId3">
-            <a:extLst>
-              <a:ext uri="{28A0092B-C50C-407E-A947-70E740481C1C}">
-                <a14:useLocalDpi xmlns:a14="http://schemas.microsoft.com/office/drawing/2010/main" val="0"/>
-              </a:ext>
-            </a:extLst>
-          </a:blip>
-          <a:stretch>
-            <a:fillRect/>
-          </a:stretch>
-        </p:blipFill>
-        <p:spPr>
-          <a:xfrm>
-            <a:off x="11743046" y="3909515"/>
-            <a:ext cx="390035" cy="390035"/>
-          </a:xfrm>
-          <a:prstGeom prst="rect">
-            <a:avLst/>
-          </a:prstGeom>
-        </p:spPr>
-      </p:pic>
-      <p:pic>
-        <p:nvPicPr>
-          <p:cNvPr id="30" name="Picture 29"/>
-          <p:cNvPicPr>
-            <a:picLocks noChangeAspect="1"/>
-          </p:cNvPicPr>
-          <p:nvPr/>
-        </p:nvPicPr>
-        <p:blipFill>
-          <a:blip r:embed="rId3">
-            <a:extLst>
-              <a:ext uri="{28A0092B-C50C-407E-A947-70E740481C1C}">
-                <a14:useLocalDpi xmlns:a14="http://schemas.microsoft.com/office/drawing/2010/main" val="0"/>
-              </a:ext>
-            </a:extLst>
-          </a:blip>
-          <a:stretch>
-            <a:fillRect/>
-          </a:stretch>
-        </p:blipFill>
-        <p:spPr>
-          <a:xfrm>
-            <a:off x="11743656" y="3533570"/>
+            <a:off x="11729079" y="4090790"/>
             <a:ext cx="390035" cy="390035"/>
           </a:xfrm>
           <a:prstGeom prst="rect">

</xml_diff>